<commit_message>
Update presentation for Introduction to DOM And Events
</commit_message>
<xml_diff>
--- a/JavaScript_For_FrontEnd/02. JavaScript-for-Front-End-Introduction-to-DOM-and-Events/02. JavaScript-for-Front-End-Introduction-to-DOM-and-Events.pptx
+++ b/JavaScript_For_FrontEnd/02. JavaScript-for-Front-End-Introduction-to-DOM-and-Events/02. JavaScript-for-Front-End-Introduction-to-DOM-and-Events.pptx
@@ -17,7 +17,7 @@
     <p:sldId id="453" r:id="rId6"/>
     <p:sldId id="454" r:id="rId7"/>
     <p:sldId id="455" r:id="rId8"/>
-    <p:sldId id="456" r:id="rId9"/>
+    <p:sldId id="467" r:id="rId9"/>
     <p:sldId id="457" r:id="rId10"/>
     <p:sldId id="458" r:id="rId11"/>
     <p:sldId id="459" r:id="rId12"/>
@@ -147,7 +147,7 @@
             <p14:sldId id="453"/>
             <p14:sldId id="454"/>
             <p14:sldId id="455"/>
-            <p14:sldId id="456"/>
+            <p14:sldId id="467"/>
             <p14:sldId id="457"/>
             <p14:sldId id="458"/>
             <p14:sldId id="459"/>
@@ -291,7 +291,7 @@
             <a:fld id="{FE5B4EDC-59C0-49C7-8ADA-5A781B329E02}" type="datetimeFigureOut">
               <a:rPr lang="en-US"/>
               <a:pPr/>
-              <a:t>7/3/2018</a:t>
+              <a:t>7/4/2018</a:t>
             </a:fld>
             <a:endParaRPr dirty="0"/>
           </a:p>
@@ -490,7 +490,7 @@
             <a:fld id="{F2D8D46A-B586-417D-BFBD-8C8FE0AAF762}" type="datetimeFigureOut">
               <a:rPr lang="en-US" smtClean="0"/>
               <a:pPr/>
-              <a:t>7/3/2018</a:t>
+              <a:t>7/4/2018</a:t>
             </a:fld>
             <a:endParaRPr lang="en-US" dirty="0"/>
           </a:p>
@@ -2334,7 +2334,7 @@
             <a:fld id="{055373AC-9AA7-423B-BA00-BA1C74164DBD}" type="datetime1">
               <a:rPr lang="en-US" smtClean="0"/>
               <a:pPr/>
-              <a:t>7/3/2018</a:t>
+              <a:t>7/4/2018</a:t>
             </a:fld>
             <a:endParaRPr lang="en-US" dirty="0"/>
           </a:p>
@@ -4099,7 +4099,7 @@
             <a:fld id="{055373AC-9AA7-423B-BA00-BA1C74164DBD}" type="datetime1">
               <a:rPr lang="en-US" smtClean="0"/>
               <a:pPr/>
-              <a:t>7/3/2018</a:t>
+              <a:t>7/4/2018</a:t>
             </a:fld>
             <a:endParaRPr lang="en-US" dirty="0"/>
           </a:p>
@@ -5247,7 +5247,7 @@
         </p:nvSpPr>
         <p:spPr>
           <a:xfrm>
-            <a:off x="836614" y="1256400"/>
+            <a:off x="994055" y="1307302"/>
             <a:ext cx="10515598" cy="2157102"/>
           </a:xfrm>
           <a:prstGeom prst="rect">
@@ -5686,7 +5686,7 @@
         </p:nvSpPr>
         <p:spPr>
           <a:xfrm>
-            <a:off x="836614" y="3732368"/>
+            <a:off x="994055" y="3720740"/>
             <a:ext cx="10515598" cy="2641850"/>
           </a:xfrm>
           <a:prstGeom prst="rect">
@@ -6199,8 +6199,8 @@
         </p:blipFill>
         <p:spPr>
           <a:xfrm>
-            <a:off x="7085012" y="1371600"/>
-            <a:ext cx="4424641" cy="1930119"/>
+            <a:off x="7085012" y="1469987"/>
+            <a:ext cx="4199097" cy="1831732"/>
           </a:xfrm>
           <a:prstGeom prst="roundRect">
             <a:avLst>
@@ -6225,8 +6225,8 @@
         </p:blipFill>
         <p:spPr>
           <a:xfrm>
-            <a:off x="7973667" y="5204350"/>
-            <a:ext cx="3535986" cy="1272650"/>
+            <a:off x="7973667" y="4953000"/>
+            <a:ext cx="3535986" cy="1409590"/>
           </a:xfrm>
           <a:prstGeom prst="roundRect">
             <a:avLst>
@@ -6637,54 +6637,6 @@
           </a:p>
         </p:txBody>
       </p:sp>
-      <p:pic>
-        <p:nvPicPr>
-          <p:cNvPr id="7" name="Picture 6"/>
-          <p:cNvPicPr>
-            <a:picLocks noChangeAspect="1"/>
-          </p:cNvPicPr>
-          <p:nvPr/>
-        </p:nvPicPr>
-        <p:blipFill>
-          <a:blip r:embed="rId2"/>
-          <a:stretch>
-            <a:fillRect/>
-          </a:stretch>
-        </p:blipFill>
-        <p:spPr>
-          <a:xfrm>
-            <a:off x="1882141" y="2743200"/>
-            <a:ext cx="3734124" cy="3560926"/>
-          </a:xfrm>
-          <a:prstGeom prst="rect">
-            <a:avLst/>
-          </a:prstGeom>
-        </p:spPr>
-      </p:pic>
-      <p:pic>
-        <p:nvPicPr>
-          <p:cNvPr id="9" name="Picture 8"/>
-          <p:cNvPicPr>
-            <a:picLocks noChangeAspect="1"/>
-          </p:cNvPicPr>
-          <p:nvPr/>
-        </p:nvPicPr>
-        <p:blipFill>
-          <a:blip r:embed="rId3"/>
-          <a:stretch>
-            <a:fillRect/>
-          </a:stretch>
-        </p:blipFill>
-        <p:spPr>
-          <a:xfrm>
-            <a:off x="6627488" y="2743200"/>
-            <a:ext cx="3734124" cy="3560926"/>
-          </a:xfrm>
-          <a:prstGeom prst="rect">
-            <a:avLst/>
-          </a:prstGeom>
-        </p:spPr>
-      </p:pic>
       <p:sp>
         <p:nvSpPr>
           <p:cNvPr id="10" name="Arrow: Right 9"/>
@@ -6693,7 +6645,7 @@
         </p:nvSpPr>
         <p:spPr>
           <a:xfrm>
-            <a:off x="5929726" y="4371263"/>
+            <a:off x="5668314" y="4344035"/>
             <a:ext cx="381000" cy="304800"/>
           </a:xfrm>
           <a:prstGeom prst="rightArrow">
@@ -6725,6 +6677,50 @@
           </a:p>
         </p:txBody>
       </p:sp>
+      <p:pic>
+        <p:nvPicPr>
+          <p:cNvPr id="8" name="Picture 7"/>
+          <p:cNvPicPr/>
+          <p:nvPr/>
+        </p:nvPicPr>
+        <p:blipFill>
+          <a:blip r:embed="rId2"/>
+          <a:stretch>
+            <a:fillRect/>
+          </a:stretch>
+        </p:blipFill>
+        <p:spPr>
+          <a:xfrm>
+            <a:off x="1341484" y="3124200"/>
+            <a:ext cx="3635375" cy="2695498"/>
+          </a:xfrm>
+          <a:prstGeom prst="rect">
+            <a:avLst/>
+          </a:prstGeom>
+        </p:spPr>
+      </p:pic>
+      <p:pic>
+        <p:nvPicPr>
+          <p:cNvPr id="11" name="Picture 10"/>
+          <p:cNvPicPr/>
+          <p:nvPr/>
+        </p:nvPicPr>
+        <p:blipFill>
+          <a:blip r:embed="rId3"/>
+          <a:stretch>
+            <a:fillRect/>
+          </a:stretch>
+        </p:blipFill>
+        <p:spPr>
+          <a:xfrm>
+            <a:off x="6704012" y="3124200"/>
+            <a:ext cx="3886200" cy="2695498"/>
+          </a:xfrm>
+          <a:prstGeom prst="rect">
+            <a:avLst/>
+          </a:prstGeom>
+        </p:spPr>
+      </p:pic>
     </p:spTree>
     <p:extLst>
       <p:ext uri="{BB962C8B-B14F-4D97-AF65-F5344CB8AC3E}">
@@ -7604,10 +7600,8 @@
       </p:sp>
       <p:pic>
         <p:nvPicPr>
-          <p:cNvPr id="6" name="Picture 5"/>
-          <p:cNvPicPr>
-            <a:picLocks noChangeAspect="1"/>
-          </p:cNvPicPr>
+          <p:cNvPr id="7" name="Picture 6"/>
+          <p:cNvPicPr/>
           <p:nvPr/>
         </p:nvPicPr>
         <p:blipFill>
@@ -7618,8 +7612,8 @@
         </p:blipFill>
         <p:spPr>
           <a:xfrm>
-            <a:off x="8228012" y="3208730"/>
-            <a:ext cx="3147678" cy="3001680"/>
+            <a:off x="7694612" y="3429000"/>
+            <a:ext cx="3711575" cy="2847898"/>
           </a:xfrm>
           <a:prstGeom prst="rect">
             <a:avLst/>
@@ -10447,16 +10441,44 @@
           <a:p>
             <a:pPr algn="ctr"/>
             <a:r>
-              <a:rPr lang="en-US" dirty="0"/>
+              <a:rPr lang="en-US" dirty="0">
+                <a:solidFill>
+                  <a:schemeClr val="tx2">
+                    <a:lumMod val="75000"/>
+                  </a:schemeClr>
+                </a:solidFill>
+              </a:rPr>
               <a:t>Check your solution here: </a:t>
             </a:r>
             <a:r>
               <a:rPr lang="en-US" dirty="0">
+                <a:solidFill>
+                  <a:schemeClr val="tx2">
+                    <a:lumMod val="75000"/>
+                  </a:schemeClr>
+                </a:solidFill>
                 <a:hlinkClick r:id="rId3"/>
               </a:rPr>
-              <a:t>https://judge.softuni.bg/Contests/328</a:t>
-            </a:r>
-            <a:endParaRPr lang="en-US" dirty="0"/>
+              <a:t>https://</a:t>
+            </a:r>
+            <a:r>
+              <a:rPr lang="en-US" dirty="0" smtClean="0">
+                <a:solidFill>
+                  <a:schemeClr val="tx2">
+                    <a:lumMod val="75000"/>
+                  </a:schemeClr>
+                </a:solidFill>
+                <a:hlinkClick r:id="rId3"/>
+              </a:rPr>
+              <a:t>judge.softuni.bg/Contests/1096</a:t>
+            </a:r>
+            <a:endParaRPr lang="en-US" dirty="0">
+              <a:solidFill>
+                <a:schemeClr val="tx2">
+                  <a:lumMod val="75000"/>
+                </a:schemeClr>
+              </a:solidFill>
+            </a:endParaRPr>
           </a:p>
         </p:txBody>
       </p:sp>
@@ -11552,8 +11574,8 @@
         </p:nvSpPr>
         <p:spPr>
           <a:xfrm>
-            <a:off x="836614" y="1383609"/>
-            <a:ext cx="10515598" cy="4788591"/>
+            <a:off x="303212" y="1192457"/>
+            <a:ext cx="10515598" cy="5035134"/>
           </a:xfrm>
           <a:prstGeom prst="rect">
             <a:avLst/>
@@ -11761,7 +11783,7 @@
               <a:buNone/>
             </a:pPr>
             <a:r>
-              <a:rPr lang="en-US" sz="2700" b="1" noProof="1">
+              <a:rPr lang="en-US" sz="2600" b="1" noProof="1">
                 <a:solidFill>
                   <a:srgbClr val="FBEEDC"/>
                 </a:solidFill>
@@ -11778,7 +11800,7 @@
               <a:t>&lt;</a:t>
             </a:r>
             <a:r>
-              <a:rPr lang="en-US" sz="2700" b="1" noProof="1">
+              <a:rPr lang="en-US" sz="2600" b="1" noProof="1">
                 <a:solidFill>
                   <a:schemeClr val="tx2">
                     <a:lumMod val="75000"/>
@@ -11797,7 +11819,7 @@
               <a:t>table</a:t>
             </a:r>
             <a:r>
-              <a:rPr lang="en-US" sz="2700" b="1" noProof="1">
+              <a:rPr lang="en-US" sz="2600" b="1" noProof="1">
                 <a:solidFill>
                   <a:srgbClr val="FBEEDC"/>
                 </a:solidFill>
@@ -11832,7 +11854,7 @@
               <a:buNone/>
             </a:pPr>
             <a:r>
-              <a:rPr lang="en-US" sz="2700" b="1" noProof="1">
+              <a:rPr lang="en-US" sz="2600" b="1" noProof="1">
                 <a:solidFill>
                   <a:srgbClr val="FBEEDC"/>
                 </a:solidFill>
@@ -11849,7 +11871,7 @@
               <a:t> &lt;</a:t>
             </a:r>
             <a:r>
-              <a:rPr lang="en-US" sz="2700" b="1" noProof="1">
+              <a:rPr lang="en-US" sz="2600" b="1" noProof="1">
                 <a:solidFill>
                   <a:schemeClr val="tx2">
                     <a:lumMod val="75000"/>
@@ -11868,7 +11890,7 @@
               <a:t>tr</a:t>
             </a:r>
             <a:r>
-              <a:rPr lang="en-US" sz="2700" b="1" noProof="1">
+              <a:rPr lang="en-US" sz="2600" b="1" noProof="1">
                 <a:solidFill>
                   <a:srgbClr val="FBEEDC"/>
                 </a:solidFill>
@@ -11885,7 +11907,7 @@
               <a:t>&gt;&lt;</a:t>
             </a:r>
             <a:r>
-              <a:rPr lang="en-US" sz="2700" b="1" noProof="1">
+              <a:rPr lang="en-US" sz="2600" b="1" noProof="1">
                 <a:solidFill>
                   <a:schemeClr val="tx2">
                     <a:lumMod val="75000"/>
@@ -11904,7 +11926,7 @@
               <a:t>th</a:t>
             </a:r>
             <a:r>
-              <a:rPr lang="en-US" sz="2700" b="1" noProof="1">
+              <a:rPr lang="en-US" sz="2600" b="1" noProof="1">
                 <a:solidFill>
                   <a:srgbClr val="FBEEDC"/>
                 </a:solidFill>
@@ -11921,7 +11943,7 @@
               <a:t>&gt;Name&lt;/</a:t>
             </a:r>
             <a:r>
-              <a:rPr lang="en-US" sz="2700" b="1" noProof="1">
+              <a:rPr lang="en-US" sz="2600" b="1" noProof="1">
                 <a:solidFill>
                   <a:schemeClr val="tx2">
                     <a:lumMod val="75000"/>
@@ -11940,7 +11962,7 @@
               <a:t>th</a:t>
             </a:r>
             <a:r>
-              <a:rPr lang="en-US" sz="2700" b="1" noProof="1">
+              <a:rPr lang="en-US" sz="2600" b="1" noProof="1">
                 <a:solidFill>
                   <a:srgbClr val="FBEEDC"/>
                 </a:solidFill>
@@ -11957,7 +11979,7 @@
               <a:t>&gt;&lt;</a:t>
             </a:r>
             <a:r>
-              <a:rPr lang="en-US" sz="2700" b="1" noProof="1">
+              <a:rPr lang="en-US" sz="2600" b="1" noProof="1">
                 <a:solidFill>
                   <a:schemeClr val="tx2">
                     <a:lumMod val="75000"/>
@@ -11976,7 +11998,7 @@
               <a:t>th</a:t>
             </a:r>
             <a:r>
-              <a:rPr lang="en-US" sz="2700" b="1" noProof="1">
+              <a:rPr lang="en-US" sz="2600" b="1" noProof="1">
                 <a:solidFill>
                   <a:srgbClr val="FBEEDC"/>
                 </a:solidFill>
@@ -11993,7 +12015,7 @@
               <a:t>&gt;Email&lt;/</a:t>
             </a:r>
             <a:r>
-              <a:rPr lang="en-US" sz="2700" b="1" noProof="1">
+              <a:rPr lang="en-US" sz="2600" b="1" noProof="1">
                 <a:solidFill>
                   <a:schemeClr val="tx2">
                     <a:lumMod val="75000"/>
@@ -12012,7 +12034,7 @@
               <a:t>th</a:t>
             </a:r>
             <a:r>
-              <a:rPr lang="en-US" sz="2700" b="1" noProof="1">
+              <a:rPr lang="en-US" sz="2600" b="1" noProof="1">
                 <a:solidFill>
                   <a:srgbClr val="FBEEDC"/>
                 </a:solidFill>
@@ -12029,7 +12051,7 @@
               <a:t>&gt;&lt;/</a:t>
             </a:r>
             <a:r>
-              <a:rPr lang="en-US" sz="2700" b="1" noProof="1">
+              <a:rPr lang="en-US" sz="2600" b="1" noProof="1">
                 <a:solidFill>
                   <a:schemeClr val="tx2">
                     <a:lumMod val="75000"/>
@@ -12048,7 +12070,7 @@
               <a:t>tr</a:t>
             </a:r>
             <a:r>
-              <a:rPr lang="en-US" sz="2700" b="1" noProof="1">
+              <a:rPr lang="en-US" sz="2600" b="1" noProof="1">
                 <a:solidFill>
                   <a:srgbClr val="FBEEDC"/>
                 </a:solidFill>
@@ -12083,7 +12105,7 @@
               <a:buNone/>
             </a:pPr>
             <a:r>
-              <a:rPr lang="en-US" sz="2700" b="1" noProof="1">
+              <a:rPr lang="en-US" sz="2600" b="1" noProof="1">
                 <a:solidFill>
                   <a:srgbClr val="FBEEDC"/>
                 </a:solidFill>
@@ -12100,7 +12122,7 @@
               <a:t> &lt;</a:t>
             </a:r>
             <a:r>
-              <a:rPr lang="en-US" sz="2700" b="1" noProof="1">
+              <a:rPr lang="en-US" sz="2600" b="1" noProof="1">
                 <a:solidFill>
                   <a:schemeClr val="tx2">
                     <a:lumMod val="75000"/>
@@ -12119,7 +12141,7 @@
               <a:t>tr</a:t>
             </a:r>
             <a:r>
-              <a:rPr lang="en-US" sz="2700" b="1" noProof="1">
+              <a:rPr lang="en-US" sz="2600" b="1" noProof="1">
                 <a:solidFill>
                   <a:srgbClr val="FBEEDC"/>
                 </a:solidFill>
@@ -12136,7 +12158,7 @@
               <a:t>&gt;&lt;</a:t>
             </a:r>
             <a:r>
-              <a:rPr lang="en-US" sz="2700" b="1" noProof="1">
+              <a:rPr lang="en-US" sz="2600" b="1" noProof="1">
                 <a:solidFill>
                   <a:schemeClr val="tx2">
                     <a:lumMod val="75000"/>
@@ -12155,7 +12177,7 @@
               <a:t>td</a:t>
             </a:r>
             <a:r>
-              <a:rPr lang="en-US" sz="2700" b="1" noProof="1">
+              <a:rPr lang="en-US" sz="2600" b="1" noProof="1">
                 <a:solidFill>
                   <a:srgbClr val="FBEEDC"/>
                 </a:solidFill>
@@ -12172,7 +12194,7 @@
               <a:t>&gt;Eve&lt;/</a:t>
             </a:r>
             <a:r>
-              <a:rPr lang="en-US" sz="2700" b="1" noProof="1">
+              <a:rPr lang="en-US" sz="2600" b="1" noProof="1">
                 <a:solidFill>
                   <a:schemeClr val="tx2">
                     <a:lumMod val="75000"/>
@@ -12191,7 +12213,7 @@
               <a:t>td</a:t>
             </a:r>
             <a:r>
-              <a:rPr lang="en-US" sz="2700" b="1" noProof="1">
+              <a:rPr lang="en-US" sz="2600" b="1" noProof="1">
                 <a:solidFill>
                   <a:srgbClr val="FBEEDC"/>
                 </a:solidFill>
@@ -12208,7 +12230,7 @@
               <a:t>&gt;&lt;</a:t>
             </a:r>
             <a:r>
-              <a:rPr lang="en-US" sz="2700" b="1" noProof="1">
+              <a:rPr lang="en-US" sz="2600" b="1" noProof="1">
                 <a:solidFill>
                   <a:schemeClr val="tx2">
                     <a:lumMod val="75000"/>
@@ -12227,7 +12249,7 @@
               <a:t>td</a:t>
             </a:r>
             <a:r>
-              <a:rPr lang="en-US" sz="2700" b="1" noProof="1">
+              <a:rPr lang="en-US" sz="2600" b="1" noProof="1">
                 <a:solidFill>
                   <a:srgbClr val="FBEEDC"/>
                 </a:solidFill>
@@ -12244,7 +12266,7 @@
               <a:t>&gt;eve@gmail.com&lt;/</a:t>
             </a:r>
             <a:r>
-              <a:rPr lang="en-US" sz="2700" b="1" noProof="1">
+              <a:rPr lang="en-US" sz="2600" b="1" noProof="1">
                 <a:solidFill>
                   <a:schemeClr val="tx2">
                     <a:lumMod val="75000"/>
@@ -12263,7 +12285,7 @@
               <a:t>td</a:t>
             </a:r>
             <a:r>
-              <a:rPr lang="en-US" sz="2700" b="1" noProof="1">
+              <a:rPr lang="en-US" sz="2600" b="1" noProof="1">
                 <a:solidFill>
                   <a:srgbClr val="FBEEDC"/>
                 </a:solidFill>
@@ -12280,7 +12302,7 @@
               <a:t>&gt;&lt;/</a:t>
             </a:r>
             <a:r>
-              <a:rPr lang="en-US" sz="2700" b="1" noProof="1">
+              <a:rPr lang="en-US" sz="2600" b="1" noProof="1">
                 <a:solidFill>
                   <a:schemeClr val="tx2">
                     <a:lumMod val="75000"/>
@@ -12299,7 +12321,7 @@
               <a:t>tr</a:t>
             </a:r>
             <a:r>
-              <a:rPr lang="en-US" sz="2700" b="1" noProof="1">
+              <a:rPr lang="en-US" sz="2600" b="1" noProof="1">
                 <a:solidFill>
                   <a:srgbClr val="FBEEDC"/>
                 </a:solidFill>
@@ -12334,7 +12356,7 @@
               <a:buNone/>
             </a:pPr>
             <a:r>
-              <a:rPr lang="en-US" sz="2700" b="1" noProof="1">
+              <a:rPr lang="en-US" sz="2600" b="1" noProof="1">
                 <a:solidFill>
                   <a:srgbClr val="FBEEDC"/>
                 </a:solidFill>
@@ -12351,7 +12373,7 @@
               <a:t> &lt;</a:t>
             </a:r>
             <a:r>
-              <a:rPr lang="en-US" sz="2700" b="1" noProof="1">
+              <a:rPr lang="en-US" sz="2600" b="1" noProof="1">
                 <a:solidFill>
                   <a:schemeClr val="tx2">
                     <a:lumMod val="75000"/>
@@ -12370,7 +12392,7 @@
               <a:t>tr</a:t>
             </a:r>
             <a:r>
-              <a:rPr lang="en-US" sz="2700" b="1" noProof="1">
+              <a:rPr lang="en-US" sz="2600" b="1" noProof="1">
                 <a:solidFill>
                   <a:srgbClr val="FBEEDC"/>
                 </a:solidFill>
@@ -12387,7 +12409,7 @@
               <a:t>&gt;&lt;</a:t>
             </a:r>
             <a:r>
-              <a:rPr lang="en-US" sz="2700" b="1" noProof="1">
+              <a:rPr lang="en-US" sz="2600" b="1" noProof="1">
                 <a:solidFill>
                   <a:schemeClr val="tx2">
                     <a:lumMod val="75000"/>
@@ -12406,7 +12428,7 @@
               <a:t>td</a:t>
             </a:r>
             <a:r>
-              <a:rPr lang="en-US" sz="2700" b="1" noProof="1">
+              <a:rPr lang="en-US" sz="2600" b="1" noProof="1">
                 <a:solidFill>
                   <a:srgbClr val="FBEEDC"/>
                 </a:solidFill>
@@ -12423,7 +12445,7 @@
               <a:t>&gt;Nick&lt;/</a:t>
             </a:r>
             <a:r>
-              <a:rPr lang="en-US" sz="2700" b="1" noProof="1">
+              <a:rPr lang="en-US" sz="2600" b="1" noProof="1">
                 <a:solidFill>
                   <a:schemeClr val="tx2">
                     <a:lumMod val="75000"/>
@@ -12442,7 +12464,7 @@
               <a:t>td</a:t>
             </a:r>
             <a:r>
-              <a:rPr lang="en-US" sz="2700" b="1" noProof="1">
+              <a:rPr lang="en-US" sz="2600" b="1" noProof="1">
                 <a:solidFill>
                   <a:srgbClr val="FBEEDC"/>
                 </a:solidFill>
@@ -12459,7 +12481,7 @@
               <a:t>&gt;&lt;</a:t>
             </a:r>
             <a:r>
-              <a:rPr lang="en-US" sz="2700" b="1" noProof="1">
+              <a:rPr lang="en-US" sz="2600" b="1" noProof="1">
                 <a:solidFill>
                   <a:schemeClr val="tx2">
                     <a:lumMod val="75000"/>
@@ -12478,7 +12500,7 @@
               <a:t>td</a:t>
             </a:r>
             <a:r>
-              <a:rPr lang="en-US" sz="2700" b="1" noProof="1">
+              <a:rPr lang="en-US" sz="2600" b="1" noProof="1">
                 <a:solidFill>
                   <a:srgbClr val="FBEEDC"/>
                 </a:solidFill>
@@ -12495,7 +12517,7 @@
               <a:t>&gt;nick@yahooo.com&lt;/</a:t>
             </a:r>
             <a:r>
-              <a:rPr lang="en-US" sz="2700" b="1" noProof="1">
+              <a:rPr lang="en-US" sz="2600" b="1" noProof="1">
                 <a:solidFill>
                   <a:schemeClr val="tx2">
                     <a:lumMod val="75000"/>
@@ -12514,7 +12536,7 @@
               <a:t>td</a:t>
             </a:r>
             <a:r>
-              <a:rPr lang="en-US" sz="2700" b="1" noProof="1">
+              <a:rPr lang="en-US" sz="2600" b="1" noProof="1">
                 <a:solidFill>
                   <a:srgbClr val="FBEEDC"/>
                 </a:solidFill>
@@ -12531,7 +12553,7 @@
               <a:t>&gt;&lt;/</a:t>
             </a:r>
             <a:r>
-              <a:rPr lang="en-US" sz="2700" b="1" noProof="1">
+              <a:rPr lang="en-US" sz="2600" b="1" noProof="1">
                 <a:solidFill>
                   <a:schemeClr val="tx2">
                     <a:lumMod val="75000"/>
@@ -12550,7 +12572,7 @@
               <a:t>tr</a:t>
             </a:r>
             <a:r>
-              <a:rPr lang="en-US" sz="2700" b="1" noProof="1">
+              <a:rPr lang="en-US" sz="2600" b="1" noProof="1">
                 <a:solidFill>
                   <a:srgbClr val="FBEEDC"/>
                 </a:solidFill>
@@ -12585,7 +12607,7 @@
               <a:buNone/>
             </a:pPr>
             <a:r>
-              <a:rPr lang="en-US" sz="2700" b="1" noProof="1">
+              <a:rPr lang="en-US" sz="2600" b="1" noProof="1">
                 <a:solidFill>
                   <a:srgbClr val="FBEEDC"/>
                 </a:solidFill>
@@ -12602,7 +12624,7 @@
               <a:t> &lt;</a:t>
             </a:r>
             <a:r>
-              <a:rPr lang="en-US" sz="2700" b="1" noProof="1">
+              <a:rPr lang="en-US" sz="2600" b="1" noProof="1">
                 <a:solidFill>
                   <a:schemeClr val="tx2">
                     <a:lumMod val="75000"/>
@@ -12621,7 +12643,7 @@
               <a:t>tr</a:t>
             </a:r>
             <a:r>
-              <a:rPr lang="en-US" sz="2700" b="1" noProof="1">
+              <a:rPr lang="en-US" sz="2600" b="1" noProof="1">
                 <a:solidFill>
                   <a:srgbClr val="FBEEDC"/>
                 </a:solidFill>
@@ -12638,7 +12660,7 @@
               <a:t>&gt;&lt;</a:t>
             </a:r>
             <a:r>
-              <a:rPr lang="en-US" sz="2700" b="1" noProof="1">
+              <a:rPr lang="en-US" sz="2600" b="1" noProof="1">
                 <a:solidFill>
                   <a:schemeClr val="tx2">
                     <a:lumMod val="75000"/>
@@ -12657,7 +12679,7 @@
               <a:t>td</a:t>
             </a:r>
             <a:r>
-              <a:rPr lang="en-US" sz="2700" b="1" noProof="1">
+              <a:rPr lang="en-US" sz="2600" b="1" noProof="1">
                 <a:solidFill>
                   <a:srgbClr val="FBEEDC"/>
                 </a:solidFill>
@@ -12674,7 +12696,7 @@
               <a:t>&gt;Didi&lt;/</a:t>
             </a:r>
             <a:r>
-              <a:rPr lang="en-US" sz="2700" b="1" noProof="1">
+              <a:rPr lang="en-US" sz="2600" b="1" noProof="1">
                 <a:solidFill>
                   <a:schemeClr val="tx2">
                     <a:lumMod val="75000"/>
@@ -12693,7 +12715,7 @@
               <a:t>td</a:t>
             </a:r>
             <a:r>
-              <a:rPr lang="en-US" sz="2700" b="1" noProof="1">
+              <a:rPr lang="en-US" sz="2600" b="1" noProof="1">
                 <a:solidFill>
                   <a:srgbClr val="FBEEDC"/>
                 </a:solidFill>
@@ -12710,7 +12732,7 @@
               <a:t>&gt;&lt;</a:t>
             </a:r>
             <a:r>
-              <a:rPr lang="en-US" sz="2700" b="1" noProof="1">
+              <a:rPr lang="en-US" sz="2600" b="1" noProof="1">
                 <a:solidFill>
                   <a:schemeClr val="tx2">
                     <a:lumMod val="75000"/>
@@ -12729,7 +12751,7 @@
               <a:t>td</a:t>
             </a:r>
             <a:r>
-              <a:rPr lang="en-US" sz="2700" b="1" noProof="1">
+              <a:rPr lang="en-US" sz="2600" b="1" noProof="1">
                 <a:solidFill>
                   <a:srgbClr val="FBEEDC"/>
                 </a:solidFill>
@@ -12746,7 +12768,7 @@
               <a:t>&gt;didi@didi.net&lt;/</a:t>
             </a:r>
             <a:r>
-              <a:rPr lang="en-US" sz="2700" b="1" noProof="1">
+              <a:rPr lang="en-US" sz="2600" b="1" noProof="1">
                 <a:solidFill>
                   <a:schemeClr val="tx2">
                     <a:lumMod val="75000"/>
@@ -12765,7 +12787,7 @@
               <a:t>td</a:t>
             </a:r>
             <a:r>
-              <a:rPr lang="en-US" sz="2700" b="1" noProof="1">
+              <a:rPr lang="en-US" sz="2600" b="1" noProof="1">
                 <a:solidFill>
                   <a:srgbClr val="FBEEDC"/>
                 </a:solidFill>
@@ -12782,7 +12804,7 @@
               <a:t>&gt;&lt;/</a:t>
             </a:r>
             <a:r>
-              <a:rPr lang="en-US" sz="2700" b="1" noProof="1">
+              <a:rPr lang="en-US" sz="2600" b="1" noProof="1">
                 <a:solidFill>
                   <a:schemeClr val="tx2">
                     <a:lumMod val="75000"/>
@@ -12801,7 +12823,7 @@
               <a:t>tr</a:t>
             </a:r>
             <a:r>
-              <a:rPr lang="en-US" sz="2700" b="1" noProof="1">
+              <a:rPr lang="en-US" sz="2600" b="1" noProof="1">
                 <a:solidFill>
                   <a:srgbClr val="FBEEDC"/>
                 </a:solidFill>
@@ -12836,7 +12858,7 @@
               <a:buNone/>
             </a:pPr>
             <a:r>
-              <a:rPr lang="en-US" sz="2700" b="1" noProof="1">
+              <a:rPr lang="en-US" sz="2600" b="1" noProof="1">
                 <a:solidFill>
                   <a:srgbClr val="FBEEDC"/>
                 </a:solidFill>
@@ -12853,7 +12875,7 @@
               <a:t> &lt;</a:t>
             </a:r>
             <a:r>
-              <a:rPr lang="en-US" sz="2700" b="1" noProof="1">
+              <a:rPr lang="en-US" sz="2600" b="1" noProof="1">
                 <a:solidFill>
                   <a:schemeClr val="tx2">
                     <a:lumMod val="75000"/>
@@ -12872,7 +12894,7 @@
               <a:t>tr</a:t>
             </a:r>
             <a:r>
-              <a:rPr lang="en-US" sz="2700" b="1" noProof="1">
+              <a:rPr lang="en-US" sz="2600" b="1" noProof="1">
                 <a:solidFill>
                   <a:srgbClr val="FBEEDC"/>
                 </a:solidFill>
@@ -12889,7 +12911,7 @@
               <a:t>&gt;&lt;</a:t>
             </a:r>
             <a:r>
-              <a:rPr lang="en-US" sz="2700" b="1" noProof="1">
+              <a:rPr lang="en-US" sz="2600" b="1" noProof="1">
                 <a:solidFill>
                   <a:schemeClr val="tx2">
                     <a:lumMod val="75000"/>
@@ -12908,7 +12930,7 @@
               <a:t>td</a:t>
             </a:r>
             <a:r>
-              <a:rPr lang="en-US" sz="2700" b="1" noProof="1">
+              <a:rPr lang="en-US" sz="2600" b="1" noProof="1">
                 <a:solidFill>
                   <a:srgbClr val="FBEEDC"/>
                 </a:solidFill>
@@ -12925,7 +12947,7 @@
               <a:t>&gt;Tedy&lt;/</a:t>
             </a:r>
             <a:r>
-              <a:rPr lang="en-US" sz="2700" b="1" noProof="1">
+              <a:rPr lang="en-US" sz="2600" b="1" noProof="1">
                 <a:solidFill>
                   <a:schemeClr val="tx2">
                     <a:lumMod val="75000"/>
@@ -12944,7 +12966,7 @@
               <a:t>td</a:t>
             </a:r>
             <a:r>
-              <a:rPr lang="en-US" sz="2700" b="1" noProof="1">
+              <a:rPr lang="en-US" sz="2600" b="1" noProof="1">
                 <a:solidFill>
                   <a:srgbClr val="FBEEDC"/>
                 </a:solidFill>
@@ -12961,7 +12983,7 @@
               <a:t>&gt;&lt;</a:t>
             </a:r>
             <a:r>
-              <a:rPr lang="en-US" sz="2700" b="1" noProof="1">
+              <a:rPr lang="en-US" sz="2600" b="1" noProof="1">
                 <a:solidFill>
                   <a:schemeClr val="tx2">
                     <a:lumMod val="75000"/>
@@ -12980,7 +13002,7 @@
               <a:t>td</a:t>
             </a:r>
             <a:r>
-              <a:rPr lang="en-US" sz="2700" b="1" noProof="1">
+              <a:rPr lang="en-US" sz="2600" b="1" noProof="1">
                 <a:solidFill>
                   <a:srgbClr val="FBEEDC"/>
                 </a:solidFill>
@@ -12997,7 +13019,7 @@
               <a:t>&gt;tedy@tedy.com&lt;/</a:t>
             </a:r>
             <a:r>
-              <a:rPr lang="en-US" sz="2700" b="1" noProof="1">
+              <a:rPr lang="en-US" sz="2600" b="1" noProof="1">
                 <a:solidFill>
                   <a:schemeClr val="tx2">
                     <a:lumMod val="75000"/>
@@ -13016,7 +13038,7 @@
               <a:t>td</a:t>
             </a:r>
             <a:r>
-              <a:rPr lang="en-US" sz="2700" b="1" noProof="1">
+              <a:rPr lang="en-US" sz="2600" b="1" noProof="1">
                 <a:solidFill>
                   <a:srgbClr val="FBEEDC"/>
                 </a:solidFill>
@@ -13033,7 +13055,7 @@
               <a:t>&gt;&lt;/</a:t>
             </a:r>
             <a:r>
-              <a:rPr lang="en-US" sz="2700" b="1" noProof="1">
+              <a:rPr lang="en-US" sz="2600" b="1" noProof="1">
                 <a:solidFill>
                   <a:schemeClr val="tx2">
                     <a:lumMod val="75000"/>
@@ -13052,7 +13074,7 @@
               <a:t>tr</a:t>
             </a:r>
             <a:r>
-              <a:rPr lang="en-US" sz="2700" b="1" noProof="1">
+              <a:rPr lang="en-US" sz="2600" b="1" noProof="1">
                 <a:solidFill>
                   <a:srgbClr val="FBEEDC"/>
                 </a:solidFill>
@@ -13087,7 +13109,7 @@
               <a:buNone/>
             </a:pPr>
             <a:r>
-              <a:rPr lang="en-US" sz="2700" b="1" noProof="1">
+              <a:rPr lang="en-US" sz="2600" b="1" noProof="1">
                 <a:solidFill>
                   <a:srgbClr val="FBEEDC"/>
                 </a:solidFill>
@@ -13104,7 +13126,7 @@
               <a:t>&lt;/</a:t>
             </a:r>
             <a:r>
-              <a:rPr lang="en-US" sz="2700" b="1" noProof="1">
+              <a:rPr lang="en-US" sz="2600" b="1" noProof="1">
                 <a:solidFill>
                   <a:schemeClr val="tx2">
                     <a:lumMod val="75000"/>
@@ -13123,7 +13145,7 @@
               <a:t>table</a:t>
             </a:r>
             <a:r>
-              <a:rPr lang="en-US" sz="2700" b="1" noProof="1">
+              <a:rPr lang="en-US" sz="2600" b="1" noProof="1">
                 <a:solidFill>
                   <a:srgbClr val="FBEEDC"/>
                 </a:solidFill>
@@ -13158,24 +13180,24 @@
               <a:buNone/>
             </a:pPr>
             <a:r>
-              <a:rPr lang="en-US" sz="2700" b="1" noProof="1">
-                <a:solidFill>
-                  <a:srgbClr val="FBEEDC"/>
-                </a:solidFill>
-                <a:effectLst>
-                  <a:outerShdw blurRad="38100" dist="38100" dir="2700000" algn="tl">
-                    <a:srgbClr val="000000">
-                      <a:alpha val="43137"/>
-                    </a:srgbClr>
-                  </a:outerShdw>
-                </a:effectLst>
-                <a:latin typeface="Consolas" pitchFamily="49" charset="0"/>
-                <a:cs typeface="Consolas" pitchFamily="49" charset="0"/>
-              </a:rPr>
-              <a:t>Email: &lt;input type="text" name="</a:t>
-            </a:r>
-            <a:r>
-              <a:rPr lang="en-US" sz="2700" b="1" noProof="1">
+              <a:rPr lang="en-US" sz="2600" b="1" noProof="1">
+                <a:solidFill>
+                  <a:srgbClr val="FBEEDC"/>
+                </a:solidFill>
+                <a:effectLst>
+                  <a:outerShdw blurRad="38100" dist="38100" dir="2700000" algn="tl">
+                    <a:srgbClr val="000000">
+                      <a:alpha val="43137"/>
+                    </a:srgbClr>
+                  </a:outerShdw>
+                </a:effectLst>
+                <a:latin typeface="Consolas" pitchFamily="49" charset="0"/>
+                <a:cs typeface="Consolas" pitchFamily="49" charset="0"/>
+              </a:rPr>
+              <a:t>&lt;</a:t>
+            </a:r>
+            <a:r>
+              <a:rPr lang="en-US" sz="2600" b="1" noProof="1">
                 <a:solidFill>
                   <a:schemeClr val="tx2">
                     <a:lumMod val="75000"/>
@@ -13191,24 +13213,75 @@
                 <a:latin typeface="Consolas" pitchFamily="49" charset="0"/>
                 <a:cs typeface="Consolas" pitchFamily="49" charset="0"/>
               </a:rPr>
-              <a:t>email</a:t>
-            </a:r>
-            <a:r>
-              <a:rPr lang="en-US" sz="2700" b="1" noProof="1">
-                <a:solidFill>
-                  <a:srgbClr val="FBEEDC"/>
-                </a:solidFill>
-                <a:effectLst>
-                  <a:outerShdw blurRad="38100" dist="38100" dir="2700000" algn="tl">
-                    <a:srgbClr val="000000">
-                      <a:alpha val="43137"/>
-                    </a:srgbClr>
-                  </a:outerShdw>
-                </a:effectLst>
-                <a:latin typeface="Consolas" pitchFamily="49" charset="0"/>
-                <a:cs typeface="Consolas" pitchFamily="49" charset="0"/>
-              </a:rPr>
-              <a:t>" /&gt;</a:t>
+              <a:t>div</a:t>
+            </a:r>
+            <a:r>
+              <a:rPr lang="en-US" sz="2600" b="1" noProof="1" smtClean="0">
+                <a:solidFill>
+                  <a:srgbClr val="FBEEDC"/>
+                </a:solidFill>
+                <a:effectLst>
+                  <a:outerShdw blurRad="38100" dist="38100" dir="2700000" algn="tl">
+                    <a:srgbClr val="000000">
+                      <a:alpha val="43137"/>
+                    </a:srgbClr>
+                  </a:outerShdw>
+                </a:effectLst>
+                <a:latin typeface="Consolas" pitchFamily="49" charset="0"/>
+                <a:cs typeface="Consolas" pitchFamily="49" charset="0"/>
+              </a:rPr>
+              <a:t>&gt;</a:t>
+            </a:r>
+            <a:r>
+              <a:rPr lang="en-US" sz="2600" b="1" noProof="1">
+                <a:solidFill>
+                  <a:srgbClr val="FBEEDC"/>
+                </a:solidFill>
+                <a:effectLst>
+                  <a:outerShdw blurRad="38100" dist="38100" dir="2700000" algn="tl">
+                    <a:srgbClr val="000000">
+                      <a:alpha val="43137"/>
+                    </a:srgbClr>
+                  </a:outerShdw>
+                </a:effectLst>
+                <a:latin typeface="Consolas" pitchFamily="49" charset="0"/>
+                <a:cs typeface="Consolas" pitchFamily="49" charset="0"/>
+              </a:rPr>
+              <a:t> </a:t>
+            </a:r>
+            <a:r>
+              <a:rPr lang="en-US" sz="2600" b="1" noProof="1" smtClean="0">
+                <a:solidFill>
+                  <a:srgbClr val="FBEEDC"/>
+                </a:solidFill>
+                <a:effectLst>
+                  <a:outerShdw blurRad="38100" dist="38100" dir="2700000" algn="tl">
+                    <a:srgbClr val="000000">
+                      <a:alpha val="43137"/>
+                    </a:srgbClr>
+                  </a:outerShdw>
+                </a:effectLst>
+                <a:latin typeface="Consolas" pitchFamily="49" charset="0"/>
+                <a:cs typeface="Consolas" pitchFamily="49" charset="0"/>
+              </a:rPr>
+              <a:t>Email</a:t>
+            </a:r>
+            <a:r>
+              <a:rPr lang="en-US" sz="2600" b="1" noProof="1">
+                <a:solidFill>
+                  <a:srgbClr val="FBEEDC"/>
+                </a:solidFill>
+                <a:effectLst>
+                  <a:outerShdw blurRad="38100" dist="38100" dir="2700000" algn="tl">
+                    <a:srgbClr val="000000">
+                      <a:alpha val="43137"/>
+                    </a:srgbClr>
+                  </a:outerShdw>
+                </a:effectLst>
+                <a:latin typeface="Consolas" pitchFamily="49" charset="0"/>
+                <a:cs typeface="Consolas" pitchFamily="49" charset="0"/>
+              </a:rPr>
+              <a:t>:</a:t>
             </a:r>
           </a:p>
           <a:p>
@@ -13229,24 +13302,24 @@
               <a:buNone/>
             </a:pPr>
             <a:r>
-              <a:rPr lang="en-US" sz="2700" b="1" noProof="1">
-                <a:solidFill>
-                  <a:srgbClr val="FBEEDC"/>
-                </a:solidFill>
-                <a:effectLst>
-                  <a:outerShdw blurRad="38100" dist="38100" dir="2700000" algn="tl">
-                    <a:srgbClr val="000000">
-                      <a:alpha val="43137"/>
-                    </a:srgbClr>
-                  </a:outerShdw>
-                </a:effectLst>
-                <a:latin typeface="Consolas" pitchFamily="49" charset="0"/>
-                <a:cs typeface="Consolas" pitchFamily="49" charset="0"/>
-              </a:rPr>
-              <a:t>&lt;button onclick="</a:t>
-            </a:r>
-            <a:r>
-              <a:rPr lang="en-US" sz="2700" b="1" noProof="1">
+              <a:rPr lang="en-US" sz="2600" b="1" noProof="1" smtClean="0">
+                <a:solidFill>
+                  <a:srgbClr val="FBEEDC"/>
+                </a:solidFill>
+                <a:effectLst>
+                  <a:outerShdw blurRad="38100" dist="38100" dir="2700000" algn="tl">
+                    <a:srgbClr val="000000">
+                      <a:alpha val="43137"/>
+                    </a:srgbClr>
+                  </a:outerShdw>
+                </a:effectLst>
+                <a:latin typeface="Consolas" pitchFamily="49" charset="0"/>
+                <a:cs typeface="Consolas" pitchFamily="49" charset="0"/>
+              </a:rPr>
+              <a:t>&lt;</a:t>
+            </a:r>
+            <a:r>
+              <a:rPr lang="en-US" sz="2600" b="1" noProof="1">
                 <a:solidFill>
                   <a:schemeClr val="tx2">
                     <a:lumMod val="75000"/>
@@ -13262,25 +13335,145 @@
                 <a:latin typeface="Consolas" pitchFamily="49" charset="0"/>
                 <a:cs typeface="Consolas" pitchFamily="49" charset="0"/>
               </a:rPr>
-              <a:t>deleteByEmail()</a:t>
-            </a:r>
-            <a:r>
-              <a:rPr lang="en-US" sz="2700" b="1" noProof="1">
-                <a:solidFill>
-                  <a:srgbClr val="FBEEDC"/>
-                </a:solidFill>
-                <a:effectLst>
-                  <a:outerShdw blurRad="38100" dist="38100" dir="2700000" algn="tl">
-                    <a:srgbClr val="000000">
-                      <a:alpha val="43137"/>
-                    </a:srgbClr>
-                  </a:outerShdw>
-                </a:effectLst>
-                <a:latin typeface="Consolas" pitchFamily="49" charset="0"/>
-                <a:cs typeface="Consolas" pitchFamily="49" charset="0"/>
-              </a:rPr>
-              <a:t>"&gt;Delete&lt;/button&gt;</a:t>
-            </a:r>
+              <a:t>label</a:t>
+            </a:r>
+            <a:r>
+              <a:rPr lang="en-US" sz="2600" b="1" noProof="1" smtClean="0">
+                <a:solidFill>
+                  <a:srgbClr val="FBEEDC"/>
+                </a:solidFill>
+                <a:effectLst>
+                  <a:outerShdw blurRad="38100" dist="38100" dir="2700000" algn="tl">
+                    <a:srgbClr val="000000">
+                      <a:alpha val="43137"/>
+                    </a:srgbClr>
+                  </a:outerShdw>
+                </a:effectLst>
+                <a:latin typeface="Consolas" pitchFamily="49" charset="0"/>
+                <a:cs typeface="Consolas" pitchFamily="49" charset="0"/>
+              </a:rPr>
+              <a:t>&gt; </a:t>
+            </a:r>
+            <a:r>
+              <a:rPr lang="en-US" sz="2600" b="1" noProof="1">
+                <a:solidFill>
+                  <a:srgbClr val="FBEEDC"/>
+                </a:solidFill>
+                <a:effectLst>
+                  <a:outerShdw blurRad="38100" dist="38100" dir="2700000" algn="tl">
+                    <a:srgbClr val="000000">
+                      <a:alpha val="43137"/>
+                    </a:srgbClr>
+                  </a:outerShdw>
+                </a:effectLst>
+                <a:latin typeface="Consolas" pitchFamily="49" charset="0"/>
+                <a:cs typeface="Consolas" pitchFamily="49" charset="0"/>
+              </a:rPr>
+              <a:t>&lt;</a:t>
+            </a:r>
+            <a:r>
+              <a:rPr lang="en-US" sz="2600" b="1" noProof="1">
+                <a:solidFill>
+                  <a:schemeClr val="tx2">
+                    <a:lumMod val="75000"/>
+                  </a:schemeClr>
+                </a:solidFill>
+                <a:effectLst>
+                  <a:outerShdw blurRad="38100" dist="38100" dir="2700000" algn="tl">
+                    <a:srgbClr val="000000">
+                      <a:alpha val="43137"/>
+                    </a:srgbClr>
+                  </a:outerShdw>
+                </a:effectLst>
+                <a:latin typeface="Consolas" pitchFamily="49" charset="0"/>
+                <a:cs typeface="Consolas" pitchFamily="49" charset="0"/>
+              </a:rPr>
+              <a:t>input</a:t>
+            </a:r>
+            <a:r>
+              <a:rPr lang="en-US" sz="2600" b="1" noProof="1">
+                <a:solidFill>
+                  <a:srgbClr val="FBEEDC"/>
+                </a:solidFill>
+                <a:effectLst>
+                  <a:outerShdw blurRad="38100" dist="38100" dir="2700000" algn="tl">
+                    <a:srgbClr val="000000">
+                      <a:alpha val="43137"/>
+                    </a:srgbClr>
+                  </a:outerShdw>
+                </a:effectLst>
+                <a:latin typeface="Consolas" pitchFamily="49" charset="0"/>
+                <a:cs typeface="Consolas" pitchFamily="49" charset="0"/>
+              </a:rPr>
+              <a:t> type="text" name="email</a:t>
+            </a:r>
+            <a:r>
+              <a:rPr lang="en-US" sz="2600" b="1" noProof="1" smtClean="0">
+                <a:solidFill>
+                  <a:srgbClr val="FBEEDC"/>
+                </a:solidFill>
+                <a:effectLst>
+                  <a:outerShdw blurRad="38100" dist="38100" dir="2700000" algn="tl">
+                    <a:srgbClr val="000000">
+                      <a:alpha val="43137"/>
+                    </a:srgbClr>
+                  </a:outerShdw>
+                </a:effectLst>
+                <a:latin typeface="Consolas" pitchFamily="49" charset="0"/>
+                <a:cs typeface="Consolas" pitchFamily="49" charset="0"/>
+              </a:rPr>
+              <a:t>"/&gt; &lt;/</a:t>
+            </a:r>
+            <a:r>
+              <a:rPr lang="en-US" sz="2600" b="1" noProof="1">
+                <a:solidFill>
+                  <a:schemeClr val="tx2">
+                    <a:lumMod val="75000"/>
+                  </a:schemeClr>
+                </a:solidFill>
+                <a:effectLst>
+                  <a:outerShdw blurRad="38100" dist="38100" dir="2700000" algn="tl">
+                    <a:srgbClr val="000000">
+                      <a:alpha val="43137"/>
+                    </a:srgbClr>
+                  </a:outerShdw>
+                </a:effectLst>
+                <a:latin typeface="Consolas" pitchFamily="49" charset="0"/>
+                <a:cs typeface="Consolas" pitchFamily="49" charset="0"/>
+              </a:rPr>
+              <a:t>label</a:t>
+            </a:r>
+            <a:r>
+              <a:rPr lang="en-US" sz="2600" b="1" noProof="1" smtClean="0">
+                <a:solidFill>
+                  <a:srgbClr val="FBEEDC"/>
+                </a:solidFill>
+                <a:effectLst>
+                  <a:outerShdw blurRad="38100" dist="38100" dir="2700000" algn="tl">
+                    <a:srgbClr val="000000">
+                      <a:alpha val="43137"/>
+                    </a:srgbClr>
+                  </a:outerShdw>
+                </a:effectLst>
+                <a:latin typeface="Consolas" pitchFamily="49" charset="0"/>
+                <a:cs typeface="Consolas" pitchFamily="49" charset="0"/>
+              </a:rPr>
+              <a:t>&gt;</a:t>
+            </a:r>
+            <a:endParaRPr lang="en-US" sz="2600" b="1" noProof="1">
+              <a:solidFill>
+                <a:srgbClr val="FBEEDC"/>
+              </a:solidFill>
+              <a:effectLst>
+                <a:outerShdw blurRad="38100" dist="38100" dir="2700000" algn="tl">
+                  <a:srgbClr val="000000">
+                    <a:alpha val="43137"/>
+                  </a:srgbClr>
+                </a:outerShdw>
+              </a:effectLst>
+              <a:latin typeface="Consolas" pitchFamily="49" charset="0"/>
+              <a:cs typeface="Consolas" pitchFamily="49" charset="0"/>
+            </a:endParaRPr>
           </a:p>
           <a:p>
             <a:pPr marL="0" lvl="1" indent="0">
@@ -13300,24 +13493,24 @@
               <a:buNone/>
             </a:pPr>
             <a:r>
-              <a:rPr lang="en-US" sz="2700" b="1" noProof="1">
-                <a:solidFill>
-                  <a:srgbClr val="FBEEDC"/>
-                </a:solidFill>
-                <a:effectLst>
-                  <a:outerShdw blurRad="38100" dist="38100" dir="2700000" algn="tl">
-                    <a:srgbClr val="000000">
-                      <a:alpha val="43137"/>
-                    </a:srgbClr>
-                  </a:outerShdw>
-                </a:effectLst>
-                <a:latin typeface="Consolas" pitchFamily="49" charset="0"/>
-                <a:cs typeface="Consolas" pitchFamily="49" charset="0"/>
-              </a:rPr>
-              <a:t>&lt;div id="</a:t>
-            </a:r>
-            <a:r>
-              <a:rPr lang="en-US" sz="2700" b="1" noProof="1">
+              <a:rPr lang="en-US" sz="2600" b="1" noProof="1" smtClean="0">
+                <a:solidFill>
+                  <a:srgbClr val="FBEEDC"/>
+                </a:solidFill>
+                <a:effectLst>
+                  <a:outerShdw blurRad="38100" dist="38100" dir="2700000" algn="tl">
+                    <a:srgbClr val="000000">
+                      <a:alpha val="43137"/>
+                    </a:srgbClr>
+                  </a:outerShdw>
+                </a:effectLst>
+                <a:latin typeface="Consolas" pitchFamily="49" charset="0"/>
+                <a:cs typeface="Consolas" pitchFamily="49" charset="0"/>
+              </a:rPr>
+              <a:t>&lt;</a:t>
+            </a:r>
+            <a:r>
+              <a:rPr lang="en-US" sz="2600" b="1" noProof="1">
                 <a:solidFill>
                   <a:schemeClr val="tx2">
                     <a:lumMod val="75000"/>
@@ -13333,59 +13526,296 @@
                 <a:latin typeface="Consolas" pitchFamily="49" charset="0"/>
                 <a:cs typeface="Consolas" pitchFamily="49" charset="0"/>
               </a:rPr>
-              <a:t>result</a:t>
-            </a:r>
-            <a:r>
-              <a:rPr lang="en-US" sz="2700" b="1" noProof="1">
-                <a:solidFill>
-                  <a:srgbClr val="FBEEDC"/>
-                </a:solidFill>
-                <a:effectLst>
-                  <a:outerShdw blurRad="38100" dist="38100" dir="2700000" algn="tl">
-                    <a:srgbClr val="000000">
-                      <a:alpha val="43137"/>
-                    </a:srgbClr>
-                  </a:outerShdw>
-                </a:effectLst>
-                <a:latin typeface="Consolas" pitchFamily="49" charset="0"/>
-                <a:cs typeface="Consolas" pitchFamily="49" charset="0"/>
-              </a:rPr>
-              <a:t>" /&gt;</a:t>
+              <a:t>button</a:t>
+            </a:r>
+            <a:r>
+              <a:rPr lang="en-US" sz="2600" b="1" noProof="1">
+                <a:solidFill>
+                  <a:srgbClr val="FBEEDC"/>
+                </a:solidFill>
+                <a:effectLst>
+                  <a:outerShdw blurRad="38100" dist="38100" dir="2700000" algn="tl">
+                    <a:srgbClr val="000000">
+                      <a:alpha val="43137"/>
+                    </a:srgbClr>
+                  </a:outerShdw>
+                </a:effectLst>
+                <a:latin typeface="Consolas" pitchFamily="49" charset="0"/>
+                <a:cs typeface="Consolas" pitchFamily="49" charset="0"/>
+              </a:rPr>
+              <a:t> </a:t>
+            </a:r>
+            <a:r>
+              <a:rPr lang="en-US" sz="2600" b="1" noProof="1">
+                <a:solidFill>
+                  <a:schemeClr val="tx2">
+                    <a:lumMod val="75000"/>
+                  </a:schemeClr>
+                </a:solidFill>
+                <a:effectLst>
+                  <a:outerShdw blurRad="38100" dist="38100" dir="2700000" algn="tl">
+                    <a:srgbClr val="000000">
+                      <a:alpha val="43137"/>
+                    </a:srgbClr>
+                  </a:outerShdw>
+                </a:effectLst>
+                <a:latin typeface="Consolas" pitchFamily="49" charset="0"/>
+                <a:cs typeface="Consolas" pitchFamily="49" charset="0"/>
+              </a:rPr>
+              <a:t>onclick</a:t>
+            </a:r>
+            <a:r>
+              <a:rPr lang="en-US" sz="2600" b="1" noProof="1">
+                <a:solidFill>
+                  <a:srgbClr val="FBEEDC"/>
+                </a:solidFill>
+                <a:effectLst>
+                  <a:outerShdw blurRad="38100" dist="38100" dir="2700000" algn="tl">
+                    <a:srgbClr val="000000">
+                      <a:alpha val="43137"/>
+                    </a:srgbClr>
+                  </a:outerShdw>
+                </a:effectLst>
+                <a:latin typeface="Consolas" pitchFamily="49" charset="0"/>
+                <a:cs typeface="Consolas" pitchFamily="49" charset="0"/>
+              </a:rPr>
+              <a:t>="</a:t>
+            </a:r>
+            <a:r>
+              <a:rPr lang="en-US" sz="2600" b="1" noProof="1">
+                <a:solidFill>
+                  <a:schemeClr val="tx2">
+                    <a:lumMod val="75000"/>
+                  </a:schemeClr>
+                </a:solidFill>
+                <a:effectLst>
+                  <a:outerShdw blurRad="38100" dist="38100" dir="2700000" algn="tl">
+                    <a:srgbClr val="000000">
+                      <a:alpha val="43137"/>
+                    </a:srgbClr>
+                  </a:outerShdw>
+                </a:effectLst>
+                <a:latin typeface="Consolas" pitchFamily="49" charset="0"/>
+                <a:cs typeface="Consolas" pitchFamily="49" charset="0"/>
+              </a:rPr>
+              <a:t>deleteByEmail</a:t>
+            </a:r>
+            <a:r>
+              <a:rPr lang="en-US" sz="2600" b="1" noProof="1">
+                <a:solidFill>
+                  <a:srgbClr val="FBEEDC"/>
+                </a:solidFill>
+                <a:effectLst>
+                  <a:outerShdw blurRad="38100" dist="38100" dir="2700000" algn="tl">
+                    <a:srgbClr val="000000">
+                      <a:alpha val="43137"/>
+                    </a:srgbClr>
+                  </a:outerShdw>
+                </a:effectLst>
+                <a:latin typeface="Consolas" pitchFamily="49" charset="0"/>
+                <a:cs typeface="Consolas" pitchFamily="49" charset="0"/>
+              </a:rPr>
+              <a:t>()"&gt;Delete&lt;/</a:t>
+            </a:r>
+            <a:r>
+              <a:rPr lang="en-US" sz="2600" b="1" noProof="1">
+                <a:solidFill>
+                  <a:schemeClr val="tx2">
+                    <a:lumMod val="75000"/>
+                  </a:schemeClr>
+                </a:solidFill>
+                <a:effectLst>
+                  <a:outerShdw blurRad="38100" dist="38100" dir="2700000" algn="tl">
+                    <a:srgbClr val="000000">
+                      <a:alpha val="43137"/>
+                    </a:srgbClr>
+                  </a:outerShdw>
+                </a:effectLst>
+                <a:latin typeface="Consolas" pitchFamily="49" charset="0"/>
+                <a:cs typeface="Consolas" pitchFamily="49" charset="0"/>
+              </a:rPr>
+              <a:t>button</a:t>
+            </a:r>
+            <a:r>
+              <a:rPr lang="en-US" sz="2600" b="1" noProof="1">
+                <a:solidFill>
+                  <a:srgbClr val="FBEEDC"/>
+                </a:solidFill>
+                <a:effectLst>
+                  <a:outerShdw blurRad="38100" dist="38100" dir="2700000" algn="tl">
+                    <a:srgbClr val="000000">
+                      <a:alpha val="43137"/>
+                    </a:srgbClr>
+                  </a:outerShdw>
+                </a:effectLst>
+                <a:latin typeface="Consolas" pitchFamily="49" charset="0"/>
+                <a:cs typeface="Consolas" pitchFamily="49" charset="0"/>
+              </a:rPr>
+              <a:t>&gt;</a:t>
+            </a:r>
+          </a:p>
+          <a:p>
+            <a:pPr marL="0" lvl="1" indent="0">
+              <a:lnSpc>
+                <a:spcPct val="110000"/>
+              </a:lnSpc>
+              <a:spcBef>
+                <a:spcPts val="0"/>
+              </a:spcBef>
+              <a:spcAft>
+                <a:spcPts val="0"/>
+              </a:spcAft>
+              <a:buClr>
+                <a:srgbClr val="F2B254"/>
+              </a:buClr>
+              <a:buSzPct val="100000"/>
+              <a:buNone/>
+            </a:pPr>
+            <a:r>
+              <a:rPr lang="en-US" sz="2600" b="1" noProof="1" smtClean="0">
+                <a:solidFill>
+                  <a:srgbClr val="FBEEDC"/>
+                </a:solidFill>
+                <a:effectLst>
+                  <a:outerShdw blurRad="38100" dist="38100" dir="2700000" algn="tl">
+                    <a:srgbClr val="000000">
+                      <a:alpha val="43137"/>
+                    </a:srgbClr>
+                  </a:outerShdw>
+                </a:effectLst>
+                <a:latin typeface="Consolas" pitchFamily="49" charset="0"/>
+                <a:cs typeface="Consolas" pitchFamily="49" charset="0"/>
+              </a:rPr>
+              <a:t>&lt;</a:t>
+            </a:r>
+            <a:r>
+              <a:rPr lang="en-US" sz="2600" b="1" noProof="1">
+                <a:solidFill>
+                  <a:schemeClr val="tx2">
+                    <a:lumMod val="75000"/>
+                  </a:schemeClr>
+                </a:solidFill>
+                <a:effectLst>
+                  <a:outerShdw blurRad="38100" dist="38100" dir="2700000" algn="tl">
+                    <a:srgbClr val="000000">
+                      <a:alpha val="43137"/>
+                    </a:srgbClr>
+                  </a:outerShdw>
+                </a:effectLst>
+                <a:latin typeface="Consolas" pitchFamily="49" charset="0"/>
+                <a:cs typeface="Consolas" pitchFamily="49" charset="0"/>
+              </a:rPr>
+              <a:t>div</a:t>
+            </a:r>
+            <a:r>
+              <a:rPr lang="en-US" sz="2600" b="1" noProof="1">
+                <a:solidFill>
+                  <a:srgbClr val="FBEEDC"/>
+                </a:solidFill>
+                <a:effectLst>
+                  <a:outerShdw blurRad="38100" dist="38100" dir="2700000" algn="tl">
+                    <a:srgbClr val="000000">
+                      <a:alpha val="43137"/>
+                    </a:srgbClr>
+                  </a:outerShdw>
+                </a:effectLst>
+                <a:latin typeface="Consolas" pitchFamily="49" charset="0"/>
+                <a:cs typeface="Consolas" pitchFamily="49" charset="0"/>
+              </a:rPr>
+              <a:t> id="result"&gt;&lt;/</a:t>
+            </a:r>
+            <a:r>
+              <a:rPr lang="en-US" sz="2600" b="1" noProof="1">
+                <a:solidFill>
+                  <a:schemeClr val="tx2">
+                    <a:lumMod val="75000"/>
+                  </a:schemeClr>
+                </a:solidFill>
+                <a:effectLst>
+                  <a:outerShdw blurRad="38100" dist="38100" dir="2700000" algn="tl">
+                    <a:srgbClr val="000000">
+                      <a:alpha val="43137"/>
+                    </a:srgbClr>
+                  </a:outerShdw>
+                </a:effectLst>
+                <a:latin typeface="Consolas" pitchFamily="49" charset="0"/>
+                <a:cs typeface="Consolas" pitchFamily="49" charset="0"/>
+              </a:rPr>
+              <a:t>div</a:t>
+            </a:r>
+            <a:r>
+              <a:rPr lang="en-US" sz="2600" b="1" noProof="1" smtClean="0">
+                <a:solidFill>
+                  <a:srgbClr val="FBEEDC"/>
+                </a:solidFill>
+                <a:effectLst>
+                  <a:outerShdw blurRad="38100" dist="38100" dir="2700000" algn="tl">
+                    <a:srgbClr val="000000">
+                      <a:alpha val="43137"/>
+                    </a:srgbClr>
+                  </a:outerShdw>
+                </a:effectLst>
+                <a:latin typeface="Consolas" pitchFamily="49" charset="0"/>
+                <a:cs typeface="Consolas" pitchFamily="49" charset="0"/>
+              </a:rPr>
+              <a:t>&gt;</a:t>
+            </a:r>
+            <a:r>
+              <a:rPr lang="en-US" sz="2600" b="1" noProof="1">
+                <a:solidFill>
+                  <a:srgbClr val="FBEEDC"/>
+                </a:solidFill>
+                <a:effectLst>
+                  <a:outerShdw blurRad="38100" dist="38100" dir="2700000" algn="tl">
+                    <a:srgbClr val="000000">
+                      <a:alpha val="43137"/>
+                    </a:srgbClr>
+                  </a:outerShdw>
+                </a:effectLst>
+                <a:latin typeface="Consolas" pitchFamily="49" charset="0"/>
+                <a:cs typeface="Consolas" pitchFamily="49" charset="0"/>
+              </a:rPr>
+              <a:t>&lt;/</a:t>
+            </a:r>
+            <a:r>
+              <a:rPr lang="en-US" sz="2600" b="1" noProof="1" smtClean="0">
+                <a:solidFill>
+                  <a:schemeClr val="tx2">
+                    <a:lumMod val="75000"/>
+                  </a:schemeClr>
+                </a:solidFill>
+                <a:effectLst>
+                  <a:outerShdw blurRad="38100" dist="38100" dir="2700000" algn="tl">
+                    <a:srgbClr val="000000">
+                      <a:alpha val="43137"/>
+                    </a:srgbClr>
+                  </a:outerShdw>
+                </a:effectLst>
+                <a:latin typeface="Consolas" pitchFamily="49" charset="0"/>
+                <a:cs typeface="Consolas" pitchFamily="49" charset="0"/>
+              </a:rPr>
+              <a:t>div</a:t>
+            </a:r>
+            <a:r>
+              <a:rPr lang="en-US" sz="2600" b="1" noProof="1">
+                <a:solidFill>
+                  <a:srgbClr val="FBEEDC"/>
+                </a:solidFill>
+                <a:effectLst>
+                  <a:outerShdw blurRad="38100" dist="38100" dir="2700000" algn="tl">
+                    <a:srgbClr val="000000">
+                      <a:alpha val="43137"/>
+                    </a:srgbClr>
+                  </a:outerShdw>
+                </a:effectLst>
+                <a:latin typeface="Consolas" pitchFamily="49" charset="0"/>
+                <a:cs typeface="Consolas" pitchFamily="49" charset="0"/>
+              </a:rPr>
+              <a:t>&gt;</a:t>
             </a:r>
           </a:p>
         </p:txBody>
       </p:sp>
-      <p:pic>
-        <p:nvPicPr>
-          <p:cNvPr id="6" name="Picture 5"/>
-          <p:cNvPicPr>
-            <a:picLocks noChangeAspect="1"/>
-          </p:cNvPicPr>
-          <p:nvPr/>
-        </p:nvPicPr>
-        <p:blipFill>
-          <a:blip r:embed="rId2"/>
-          <a:stretch>
-            <a:fillRect/>
-          </a:stretch>
-        </p:blipFill>
-        <p:spPr>
-          <a:xfrm>
-            <a:off x="7329347" y="1151121"/>
-            <a:ext cx="4237065" cy="2895600"/>
-          </a:xfrm>
-          <a:prstGeom prst="rect">
-            <a:avLst/>
-          </a:prstGeom>
-          <a:effectLst>
-            <a:outerShdw blurRad="63500" sx="102000" sy="102000" algn="ctr" rotWithShape="0">
-              <a:prstClr val="black">
-                <a:alpha val="40000"/>
-              </a:prstClr>
-            </a:outerShdw>
-          </a:effectLst>
-        </p:spPr>
-      </p:pic>
     </p:spTree>
     <p:extLst>
       <p:ext uri="{BB962C8B-B14F-4D97-AF65-F5344CB8AC3E}">
@@ -13399,186 +13829,7 @@
   <p:timing>
     <p:tnLst>
       <p:par>
-        <p:cTn id="1" dur="indefinite" restart="never" nodeType="tmRoot">
-          <p:childTnLst>
-            <p:seq concurrent="1" nextAc="seek">
-              <p:cTn id="2" dur="indefinite" nodeType="mainSeq">
-                <p:childTnLst>
-                  <p:par>
-                    <p:cTn id="3" fill="hold">
-                      <p:stCondLst>
-                        <p:cond delay="indefinite"/>
-                      </p:stCondLst>
-                      <p:childTnLst>
-                        <p:par>
-                          <p:cTn id="4" fill="hold">
-                            <p:stCondLst>
-                              <p:cond delay="0"/>
-                            </p:stCondLst>
-                            <p:childTnLst>
-                              <p:par>
-                                <p:cTn id="5" presetID="1" presetClass="entr" presetSubtype="0" fill="hold" nodeType="clickEffect">
-                                  <p:stCondLst>
-                                    <p:cond delay="0"/>
-                                  </p:stCondLst>
-                                  <p:childTnLst>
-                                    <p:set>
-                                      <p:cBhvr>
-                                        <p:cTn id="6" dur="1" fill="hold">
-                                          <p:stCondLst>
-                                            <p:cond delay="0"/>
-                                          </p:stCondLst>
-                                        </p:cTn>
-                                        <p:tgtEl>
-                                          <p:spTgt spid="5">
-                                            <p:txEl>
-                                              <p:pRg st="7" end="7"/>
-                                            </p:txEl>
-                                          </p:spTgt>
-                                        </p:tgtEl>
-                                        <p:attrNameLst>
-                                          <p:attrName>style.visibility</p:attrName>
-                                        </p:attrNameLst>
-                                      </p:cBhvr>
-                                      <p:to>
-                                        <p:strVal val="visible"/>
-                                      </p:to>
-                                    </p:set>
-                                  </p:childTnLst>
-                                </p:cTn>
-                              </p:par>
-                              <p:par>
-                                <p:cTn id="7" presetID="1" presetClass="entr" presetSubtype="0" fill="hold" nodeType="withEffect">
-                                  <p:stCondLst>
-                                    <p:cond delay="0"/>
-                                  </p:stCondLst>
-                                  <p:childTnLst>
-                                    <p:set>
-                                      <p:cBhvr>
-                                        <p:cTn id="8" dur="1" fill="hold">
-                                          <p:stCondLst>
-                                            <p:cond delay="0"/>
-                                          </p:stCondLst>
-                                        </p:cTn>
-                                        <p:tgtEl>
-                                          <p:spTgt spid="5">
-                                            <p:txEl>
-                                              <p:pRg st="8" end="8"/>
-                                            </p:txEl>
-                                          </p:spTgt>
-                                        </p:tgtEl>
-                                        <p:attrNameLst>
-                                          <p:attrName>style.visibility</p:attrName>
-                                        </p:attrNameLst>
-                                      </p:cBhvr>
-                                      <p:to>
-                                        <p:strVal val="visible"/>
-                                      </p:to>
-                                    </p:set>
-                                  </p:childTnLst>
-                                </p:cTn>
-                              </p:par>
-                              <p:par>
-                                <p:cTn id="9" presetID="1" presetClass="entr" presetSubtype="0" fill="hold" nodeType="withEffect">
-                                  <p:stCondLst>
-                                    <p:cond delay="0"/>
-                                  </p:stCondLst>
-                                  <p:childTnLst>
-                                    <p:set>
-                                      <p:cBhvr>
-                                        <p:cTn id="10" dur="1" fill="hold">
-                                          <p:stCondLst>
-                                            <p:cond delay="0"/>
-                                          </p:stCondLst>
-                                        </p:cTn>
-                                        <p:tgtEl>
-                                          <p:spTgt spid="5">
-                                            <p:txEl>
-                                              <p:pRg st="9" end="9"/>
-                                            </p:txEl>
-                                          </p:spTgt>
-                                        </p:tgtEl>
-                                        <p:attrNameLst>
-                                          <p:attrName>style.visibility</p:attrName>
-                                        </p:attrNameLst>
-                                      </p:cBhvr>
-                                      <p:to>
-                                        <p:strVal val="visible"/>
-                                      </p:to>
-                                    </p:set>
-                                  </p:childTnLst>
-                                </p:cTn>
-                              </p:par>
-                            </p:childTnLst>
-                          </p:cTn>
-                        </p:par>
-                      </p:childTnLst>
-                    </p:cTn>
-                  </p:par>
-                  <p:par>
-                    <p:cTn id="11" fill="hold">
-                      <p:stCondLst>
-                        <p:cond delay="indefinite"/>
-                      </p:stCondLst>
-                      <p:childTnLst>
-                        <p:par>
-                          <p:cTn id="12" fill="hold">
-                            <p:stCondLst>
-                              <p:cond delay="0"/>
-                            </p:stCondLst>
-                            <p:childTnLst>
-                              <p:par>
-                                <p:cTn id="13" presetID="1" presetClass="entr" presetSubtype="0" fill="hold" nodeType="clickEffect">
-                                  <p:stCondLst>
-                                    <p:cond delay="0"/>
-                                  </p:stCondLst>
-                                  <p:childTnLst>
-                                    <p:set>
-                                      <p:cBhvr>
-                                        <p:cTn id="14" dur="1" fill="hold">
-                                          <p:stCondLst>
-                                            <p:cond delay="0"/>
-                                          </p:stCondLst>
-                                        </p:cTn>
-                                        <p:tgtEl>
-                                          <p:spTgt spid="6"/>
-                                        </p:tgtEl>
-                                        <p:attrNameLst>
-                                          <p:attrName>style.visibility</p:attrName>
-                                        </p:attrNameLst>
-                                      </p:cBhvr>
-                                      <p:to>
-                                        <p:strVal val="visible"/>
-                                      </p:to>
-                                    </p:set>
-                                  </p:childTnLst>
-                                </p:cTn>
-                              </p:par>
-                            </p:childTnLst>
-                          </p:cTn>
-                        </p:par>
-                      </p:childTnLst>
-                    </p:cTn>
-                  </p:par>
-                </p:childTnLst>
-              </p:cTn>
-              <p:prevCondLst>
-                <p:cond evt="onPrev" delay="0">
-                  <p:tgtEl>
-                    <p:sldTgt/>
-                  </p:tgtEl>
-                </p:cond>
-              </p:prevCondLst>
-              <p:nextCondLst>
-                <p:cond evt="onNext" delay="0">
-                  <p:tgtEl>
-                    <p:sldTgt/>
-                  </p:tgtEl>
-                </p:cond>
-              </p:nextCondLst>
-            </p:seq>
-          </p:childTnLst>
-        </p:cTn>
+        <p:cTn id="1" dur="indefinite" restart="never" nodeType="tmRoot"/>
       </p:par>
     </p:tnLst>
   </p:timing>
@@ -15180,260 +15431,22 @@
           </a:p>
         </p:txBody>
       </p:sp>
-      <p:sp>
-        <p:nvSpPr>
-          <p:cNvPr id="6" name="TextBox 5"/>
-          <p:cNvSpPr txBox="1"/>
-          <p:nvPr/>
-        </p:nvSpPr>
-        <p:spPr>
-          <a:xfrm>
-            <a:off x="3198812" y="6228964"/>
-            <a:ext cx="8367600" cy="442035"/>
-          </a:xfrm>
-          <a:prstGeom prst="rect">
-            <a:avLst/>
-          </a:prstGeom>
-          <a:solidFill>
-            <a:schemeClr val="accent5">
-              <a:lumMod val="40000"/>
-              <a:lumOff val="60000"/>
-              <a:alpha val="20000"/>
-            </a:schemeClr>
-          </a:solidFill>
-          <a:ln w="12700">
-            <a:solidFill>
-              <a:schemeClr val="accent5">
-                <a:lumMod val="60000"/>
-                <a:lumOff val="40000"/>
-              </a:schemeClr>
-            </a:solidFill>
-          </a:ln>
-        </p:spPr>
-        <p:txBody>
-          <a:bodyPr vert="horz" wrap="square" lIns="144000" tIns="36000" rIns="144000" bIns="36000" rtlCol="0">
-            <a:spAutoFit/>
-          </a:bodyPr>
-          <a:lstStyle>
-            <a:defPPr>
-              <a:defRPr lang="en-US"/>
-            </a:defPPr>
-            <a:lvl1pPr indent="0">
-              <a:lnSpc>
-                <a:spcPct val="100000"/>
-              </a:lnSpc>
-              <a:spcBef>
-                <a:spcPts val="0"/>
-              </a:spcBef>
-              <a:spcAft>
-                <a:spcPts val="0"/>
-              </a:spcAft>
-              <a:buClr>
-                <a:srgbClr val="F2B254"/>
-              </a:buClr>
-              <a:buSzPct val="100000"/>
-              <a:buFont typeface="Wingdings" panose="05000000000000000000" pitchFamily="2" charset="2"/>
-              <a:buNone/>
-              <a:defRPr b="1">
-                <a:solidFill>
-                  <a:srgbClr val="FBEEDC"/>
-                </a:solidFill>
-                <a:effectLst>
-                  <a:outerShdw blurRad="38100" dist="38100" dir="2700000" algn="tl">
-                    <a:srgbClr val="000000">
-                      <a:alpha val="43137"/>
-                    </a:srgbClr>
-                  </a:outerShdw>
-                </a:effectLst>
-                <a:latin typeface="Consolas" pitchFamily="49" charset="0"/>
-                <a:cs typeface="Consolas" pitchFamily="49" charset="0"/>
-              </a:defRPr>
-            </a:lvl1pPr>
-            <a:lvl2pPr marL="0" lvl="1" indent="0">
-              <a:lnSpc>
-                <a:spcPct val="100000"/>
-              </a:lnSpc>
-              <a:spcBef>
-                <a:spcPts val="0"/>
-              </a:spcBef>
-              <a:spcAft>
-                <a:spcPts val="0"/>
-              </a:spcAft>
-              <a:buClr>
-                <a:srgbClr val="F2B254"/>
-              </a:buClr>
-              <a:buSzPct val="100000"/>
-              <a:buFont typeface="Wingdings" panose="05000000000000000000" pitchFamily="2" charset="2"/>
-              <a:buNone/>
-              <a:defRPr sz="2500" b="1">
-                <a:solidFill>
-                  <a:srgbClr val="FBEEDC"/>
-                </a:solidFill>
-                <a:effectLst>
-                  <a:outerShdw blurRad="38100" dist="38100" dir="2700000" algn="tl">
-                    <a:srgbClr val="000000">
-                      <a:alpha val="43137"/>
-                    </a:srgbClr>
-                  </a:outerShdw>
-                </a:effectLst>
-                <a:latin typeface="Consolas" pitchFamily="49" charset="0"/>
-                <a:cs typeface="Consolas" pitchFamily="49" charset="0"/>
-              </a:defRPr>
-            </a:lvl2pPr>
-            <a:lvl3pPr marL="914240" indent="-231606">
-              <a:lnSpc>
-                <a:spcPct val="105000"/>
-              </a:lnSpc>
-              <a:spcBef>
-                <a:spcPts val="600"/>
-              </a:spcBef>
-              <a:spcAft>
-                <a:spcPts val="600"/>
-              </a:spcAft>
-              <a:buClr>
-                <a:srgbClr val="EF9A1D"/>
-              </a:buClr>
-              <a:buSzPct val="80000"/>
-              <a:buFont typeface="Wingdings" panose="05000000000000000000" pitchFamily="2" charset="2"/>
-              <a:buChar char="§"/>
-              <a:defRPr sz="3000" b="0"/>
-            </a:lvl3pPr>
-            <a:lvl4pPr marL="1218987" indent="-231606">
-              <a:lnSpc>
-                <a:spcPct val="105000"/>
-              </a:lnSpc>
-              <a:spcBef>
-                <a:spcPts val="600"/>
-              </a:spcBef>
-              <a:spcAft>
-                <a:spcPts val="600"/>
-              </a:spcAft>
-              <a:buClr>
-                <a:srgbClr val="ED9411"/>
-              </a:buClr>
-              <a:buSzPct val="80000"/>
-              <a:buFont typeface="Wingdings" panose="05000000000000000000" pitchFamily="2" charset="2"/>
-              <a:buChar char="§"/>
-              <a:defRPr sz="2800" b="0"/>
-            </a:lvl4pPr>
-            <a:lvl5pPr marL="1523733" indent="-231606">
-              <a:lnSpc>
-                <a:spcPct val="105000"/>
-              </a:lnSpc>
-              <a:spcBef>
-                <a:spcPts val="600"/>
-              </a:spcBef>
-              <a:spcAft>
-                <a:spcPts val="600"/>
-              </a:spcAft>
-              <a:buClr>
-                <a:srgbClr val="E28D10"/>
-              </a:buClr>
-              <a:buSzPct val="80000"/>
-              <a:buFont typeface="Wingdings" panose="05000000000000000000" pitchFamily="2" charset="2"/>
-              <a:buChar char="§"/>
-              <a:defRPr sz="2600" b="0"/>
-            </a:lvl5pPr>
-            <a:lvl6pPr marL="1828480" indent="-231606">
-              <a:lnSpc>
-                <a:spcPct val="90000"/>
-              </a:lnSpc>
-              <a:spcBef>
-                <a:spcPts val="800"/>
-              </a:spcBef>
-              <a:buClr>
-                <a:schemeClr val="accent1"/>
-              </a:buClr>
-              <a:buSzPct val="80000"/>
-              <a:buFont typeface="Arial" pitchFamily="34" charset="0"/>
-              <a:buChar char="•"/>
-              <a:defRPr sz="2000"/>
-            </a:lvl6pPr>
-            <a:lvl7pPr marL="2133227" indent="-231606">
-              <a:lnSpc>
-                <a:spcPct val="90000"/>
-              </a:lnSpc>
-              <a:spcBef>
-                <a:spcPts val="800"/>
-              </a:spcBef>
-              <a:buClr>
-                <a:schemeClr val="accent1"/>
-              </a:buClr>
-              <a:buSzPct val="80000"/>
-              <a:buFont typeface="Arial" pitchFamily="34" charset="0"/>
-              <a:buChar char="•"/>
-              <a:defRPr sz="2000"/>
-            </a:lvl7pPr>
-            <a:lvl8pPr marL="2437972" indent="-231606">
-              <a:lnSpc>
-                <a:spcPct val="90000"/>
-              </a:lnSpc>
-              <a:spcBef>
-                <a:spcPts val="800"/>
-              </a:spcBef>
-              <a:buClr>
-                <a:schemeClr val="accent1"/>
-              </a:buClr>
-              <a:buSzPct val="80000"/>
-              <a:buFont typeface="Arial" pitchFamily="34" charset="0"/>
-              <a:buChar char="•"/>
-              <a:defRPr sz="2000" baseline="0"/>
-            </a:lvl8pPr>
-            <a:lvl9pPr marL="2742720" indent="-231606">
-              <a:lnSpc>
-                <a:spcPct val="90000"/>
-              </a:lnSpc>
-              <a:spcBef>
-                <a:spcPts val="800"/>
-              </a:spcBef>
-              <a:buClr>
-                <a:schemeClr val="accent1"/>
-              </a:buClr>
-              <a:buSzPct val="80000"/>
-              <a:buFont typeface="Arial" pitchFamily="34" charset="0"/>
-              <a:buChar char="•"/>
-              <a:defRPr sz="2000" baseline="0"/>
-            </a:lvl9pPr>
-          </a:lstStyle>
-          <a:p>
-            <a:pPr algn="ctr"/>
-            <a:r>
-              <a:rPr lang="en-US" b="0" dirty="0">
-                <a:latin typeface="+mn-lt"/>
-              </a:rPr>
-              <a:t>Check your solution here: </a:t>
-            </a:r>
-            <a:r>
-              <a:rPr lang="en-US" b="0" dirty="0">
-                <a:latin typeface="+mn-lt"/>
-                <a:hlinkClick r:id="rId2"/>
-              </a:rPr>
-              <a:t>https://judge.softuni.bg/Contests/328</a:t>
-            </a:r>
-            <a:endParaRPr lang="en-US" b="0" dirty="0">
-              <a:latin typeface="+mn-lt"/>
-            </a:endParaRPr>
-          </a:p>
-        </p:txBody>
-      </p:sp>
       <p:pic>
         <p:nvPicPr>
-          <p:cNvPr id="7" name="Picture 6"/>
-          <p:cNvPicPr>
-            <a:picLocks noChangeAspect="1"/>
-          </p:cNvPicPr>
+          <p:cNvPr id="8" name="Picture 7"/>
+          <p:cNvPicPr/>
           <p:nvPr/>
         </p:nvPicPr>
         <p:blipFill>
-          <a:blip r:embed="rId3"/>
+          <a:blip r:embed="rId2"/>
           <a:stretch>
             <a:fillRect/>
           </a:stretch>
         </p:blipFill>
         <p:spPr>
           <a:xfrm>
-            <a:off x="7923212" y="2590800"/>
-            <a:ext cx="3430923" cy="2895600"/>
+            <a:off x="8042704" y="2590800"/>
+            <a:ext cx="3447415" cy="2826797"/>
           </a:xfrm>
           <a:prstGeom prst="rect">
             <a:avLst/>
@@ -15871,51 +15884,6 @@
                       </p:childTnLst>
                     </p:cTn>
                   </p:par>
-                  <p:par>
-                    <p:cTn id="33" fill="hold">
-                      <p:stCondLst>
-                        <p:cond delay="indefinite"/>
-                      </p:stCondLst>
-                      <p:childTnLst>
-                        <p:par>
-                          <p:cTn id="34" fill="hold">
-                            <p:stCondLst>
-                              <p:cond delay="0"/>
-                            </p:stCondLst>
-                            <p:childTnLst>
-                              <p:par>
-                                <p:cTn id="35" presetID="1" presetClass="entr" presetSubtype="0" fill="hold" grpId="0" nodeType="clickEffect">
-                                  <p:stCondLst>
-                                    <p:cond delay="0"/>
-                                  </p:stCondLst>
-                                  <p:childTnLst>
-                                    <p:set>
-                                      <p:cBhvr>
-                                        <p:cTn id="36" dur="1" fill="hold">
-                                          <p:stCondLst>
-                                            <p:cond delay="0"/>
-                                          </p:stCondLst>
-                                        </p:cTn>
-                                        <p:tgtEl>
-                                          <p:spTgt spid="6"/>
-                                        </p:tgtEl>
-                                        <p:attrNameLst>
-                                          <p:attrName>style.visibility</p:attrName>
-                                        </p:attrNameLst>
-                                      </p:cBhvr>
-                                      <p:to>
-                                        <p:strVal val="visible"/>
-                                      </p:to>
-                                    </p:set>
-                                  </p:childTnLst>
-                                </p:cTn>
-                              </p:par>
-                            </p:childTnLst>
-                          </p:cTn>
-                        </p:par>
-                      </p:childTnLst>
-                    </p:cTn>
-                  </p:par>
                 </p:childTnLst>
               </p:cTn>
               <p:prevCondLst>
@@ -15937,9 +15905,6 @@
         </p:cTn>
       </p:par>
     </p:tnLst>
-    <p:bldLst>
-      <p:bldP spid="6" grpId="0" animBg="1"/>
-    </p:bldLst>
   </p:timing>
 </p:sld>
 </file>
@@ -16017,22 +15982,28 @@
       </p:sp>
       <p:pic>
         <p:nvPicPr>
-          <p:cNvPr id="14" name="Picture 13"/>
+          <p:cNvPr id="3" name="Picture 2"/>
           <p:cNvPicPr>
             <a:picLocks noChangeAspect="1"/>
           </p:cNvPicPr>
           <p:nvPr/>
         </p:nvPicPr>
         <p:blipFill>
-          <a:blip r:embed="rId2"/>
+          <a:blip r:embed="rId2" cstate="print">
+            <a:extLst>
+              <a:ext uri="{28A0092B-C50C-407E-A947-70E740481C1C}">
+                <a14:useLocalDpi xmlns:a14="http://schemas.microsoft.com/office/drawing/2010/main" val="0"/>
+              </a:ext>
+            </a:extLst>
+          </a:blip>
           <a:stretch>
             <a:fillRect/>
           </a:stretch>
         </p:blipFill>
         <p:spPr>
           <a:xfrm>
-            <a:off x="3987588" y="838200"/>
-            <a:ext cx="3524026" cy="3637568"/>
+            <a:off x="4570412" y="1210637"/>
+            <a:ext cx="2845426" cy="3490553"/>
           </a:xfrm>
           <a:prstGeom prst="rect">
             <a:avLst/>
@@ -20581,61 +20552,12 @@
           <a:lstStyle/>
           <a:p>
             <a:r>
-              <a:rPr lang="en-US"/>
+              <a:rPr lang="en-US" dirty="0"/>
               <a:t>Problem: List of Items</a:t>
             </a:r>
-            <a:endParaRPr lang="en-US" dirty="0"/>
           </a:p>
         </p:txBody>
       </p:sp>
-      <p:pic>
-        <p:nvPicPr>
-          <p:cNvPr id="8" name="Picture 7"/>
-          <p:cNvPicPr>
-            <a:picLocks noChangeAspect="1"/>
-          </p:cNvPicPr>
-          <p:nvPr/>
-        </p:nvPicPr>
-        <p:blipFill>
-          <a:blip r:embed="rId2"/>
-          <a:stretch>
-            <a:fillRect/>
-          </a:stretch>
-        </p:blipFill>
-        <p:spPr>
-          <a:xfrm>
-            <a:off x="608012" y="3173218"/>
-            <a:ext cx="3285954" cy="3131924"/>
-          </a:xfrm>
-          <a:prstGeom prst="rect">
-            <a:avLst/>
-          </a:prstGeom>
-        </p:spPr>
-      </p:pic>
-      <p:pic>
-        <p:nvPicPr>
-          <p:cNvPr id="10" name="Picture 9"/>
-          <p:cNvPicPr>
-            <a:picLocks noChangeAspect="1"/>
-          </p:cNvPicPr>
-          <p:nvPr/>
-        </p:nvPicPr>
-        <p:blipFill>
-          <a:blip r:embed="rId3"/>
-          <a:stretch>
-            <a:fillRect/>
-          </a:stretch>
-        </p:blipFill>
-        <p:spPr>
-          <a:xfrm>
-            <a:off x="8302628" y="3173218"/>
-            <a:ext cx="3285954" cy="3131924"/>
-          </a:xfrm>
-          <a:prstGeom prst="rect">
-            <a:avLst/>
-          </a:prstGeom>
-        </p:spPr>
-      </p:pic>
       <p:sp>
         <p:nvSpPr>
           <p:cNvPr id="11" name="Right Arrow 10"/>
@@ -20644,7 +20566,7 @@
         </p:nvSpPr>
         <p:spPr>
           <a:xfrm>
-            <a:off x="4039998" y="4624880"/>
+            <a:off x="3925698" y="4631301"/>
             <a:ext cx="228600" cy="228600"/>
           </a:xfrm>
           <a:prstGeom prst="rightArrow">
@@ -20684,7 +20606,7 @@
         </p:nvSpPr>
         <p:spPr>
           <a:xfrm>
-            <a:off x="7887306" y="4624880"/>
+            <a:off x="7943565" y="4631301"/>
             <a:ext cx="228600" cy="228600"/>
           </a:xfrm>
           <a:prstGeom prst="rightArrow">
@@ -20718,28 +20640,73 @@
       </p:sp>
       <p:pic>
         <p:nvPicPr>
+          <p:cNvPr id="10" name="Picture 9"/>
+          <p:cNvPicPr/>
+          <p:nvPr/>
+        </p:nvPicPr>
+        <p:blipFill>
+          <a:blip r:embed="rId2"/>
+          <a:stretch>
+            <a:fillRect/>
+          </a:stretch>
+        </p:blipFill>
+        <p:spPr>
+          <a:xfrm>
+            <a:off x="793873" y="3581400"/>
+            <a:ext cx="2712913" cy="2328402"/>
+          </a:xfrm>
+          <a:prstGeom prst="rect">
+            <a:avLst/>
+          </a:prstGeom>
+        </p:spPr>
+      </p:pic>
+      <p:pic>
+        <p:nvPicPr>
           <p:cNvPr id="14" name="Picture 13"/>
+          <p:cNvPicPr/>
+          <p:nvPr/>
+        </p:nvPicPr>
+        <p:blipFill rotWithShape="1">
+          <a:blip r:embed="rId3"/>
+          <a:srcRect b="3259"/>
+          <a:stretch/>
+        </p:blipFill>
+        <p:spPr bwMode="auto">
+          <a:xfrm>
+            <a:off x="8615342" y="3581400"/>
+            <a:ext cx="2736870" cy="2328402"/>
+          </a:xfrm>
+          <a:prstGeom prst="rect">
+            <a:avLst/>
+          </a:prstGeom>
+          <a:ln>
+            <a:noFill/>
+          </a:ln>
+          <a:extLst>
+            <a:ext uri="{53640926-AAD7-44D8-BBD7-CCE9431645EC}">
+              <a14:shadowObscured xmlns:a14="http://schemas.microsoft.com/office/drawing/2010/main"/>
+            </a:ext>
+          </a:extLst>
+        </p:spPr>
+      </p:pic>
+      <p:pic>
+        <p:nvPicPr>
+          <p:cNvPr id="8" name="Picture 7"/>
           <p:cNvPicPr>
             <a:picLocks noChangeAspect="1"/>
           </p:cNvPicPr>
           <p:nvPr/>
         </p:nvPicPr>
         <p:blipFill>
-          <a:blip r:embed="rId4">
-            <a:extLst>
-              <a:ext uri="{28A0092B-C50C-407E-A947-70E740481C1C}">
-                <a14:useLocalDpi xmlns:a14="http://schemas.microsoft.com/office/drawing/2010/main" val="0"/>
-              </a:ext>
-            </a:extLst>
-          </a:blip>
+          <a:blip r:embed="rId4"/>
           <a:stretch>
             <a:fillRect/>
           </a:stretch>
         </p:blipFill>
         <p:spPr>
           <a:xfrm>
-            <a:off x="4455320" y="3173218"/>
-            <a:ext cx="3294512" cy="3131926"/>
+            <a:off x="4503340" y="3585308"/>
+            <a:ext cx="2956720" cy="2328402"/>
           </a:xfrm>
           <a:prstGeom prst="rect">
             <a:avLst/>
@@ -20749,7 +20716,7 @@
     </p:spTree>
     <p:extLst>
       <p:ext uri="{BB962C8B-B14F-4D97-AF65-F5344CB8AC3E}">
-        <p14:creationId xmlns:p14="http://schemas.microsoft.com/office/powerpoint/2010/main" val="679684831"/>
+        <p14:creationId xmlns:p14="http://schemas.microsoft.com/office/powerpoint/2010/main" val="3910108248"/>
       </p:ext>
     </p:extLst>
   </p:cSld>
@@ -21539,28 +21506,22 @@
       </p:sp>
       <p:pic>
         <p:nvPicPr>
-          <p:cNvPr id="7" name="Picture 6"/>
+          <p:cNvPr id="6" name="Picture 5"/>
           <p:cNvPicPr>
             <a:picLocks noChangeAspect="1"/>
           </p:cNvPicPr>
           <p:nvPr/>
         </p:nvPicPr>
         <p:blipFill>
-          <a:blip r:embed="rId2">
-            <a:extLst>
-              <a:ext uri="{28A0092B-C50C-407E-A947-70E740481C1C}">
-                <a14:useLocalDpi xmlns:a14="http://schemas.microsoft.com/office/drawing/2010/main" val="0"/>
-              </a:ext>
-            </a:extLst>
-          </a:blip>
+          <a:blip r:embed="rId2"/>
           <a:stretch>
             <a:fillRect/>
           </a:stretch>
         </p:blipFill>
         <p:spPr>
           <a:xfrm>
-            <a:off x="7847012" y="2900488"/>
-            <a:ext cx="3581400" cy="3404656"/>
+            <a:off x="7694612" y="3378522"/>
+            <a:ext cx="3794920" cy="2988480"/>
           </a:xfrm>
           <a:prstGeom prst="rect">
             <a:avLst/>
@@ -23074,10 +23035,10 @@
               <a:t>Check your solution here: </a:t>
             </a:r>
             <a:r>
-              <a:rPr lang="en-US" dirty="0">
+              <a:rPr lang="en-US" dirty="0" smtClean="0">
                 <a:hlinkClick r:id="rId2"/>
               </a:rPr>
-              <a:t>https://judge.softuni.bg/Contests/328</a:t>
+              <a:t>https://judge.softuni.bg/Contests/1096</a:t>
             </a:r>
             <a:endParaRPr lang="en-US" dirty="0"/>
           </a:p>

</xml_diff>